<commit_message>
update the Automation Testing_20200519.pptx
</commit_message>
<xml_diff>
--- a/kpi/Automation Testing/Automation Testing_20200519.pptx
+++ b/kpi/Automation Testing/Automation Testing_20200519.pptx
@@ -21185,13 +21185,6 @@
               </a:rPr>
               <a:t>Wi-Fi</a:t>
             </a:r>
-            <a:endParaRPr lang="en-US" altLang="zh-TW" dirty="0" smtClean="0">
-              <a:solidFill>
-                <a:srgbClr val="00B050"/>
-              </a:solidFill>
-              <a:latin typeface="Times New Roman" panose="02020603050405020304" pitchFamily="18" charset="0"/>
-              <a:cs typeface="Times New Roman" panose="02020603050405020304" pitchFamily="18" charset="0"/>
-            </a:endParaRPr>
           </a:p>
         </p:txBody>
       </p:sp>

</xml_diff>